<commit_message>
refactoring data base schema
</commit_message>
<xml_diff>
--- a/16_Project_5_Capstone_Project/Images/capstone_project.pptx
+++ b/16_Project_5_Capstone_Project/Images/capstone_project.pptx
@@ -2,7 +2,7 @@
 <file path=ppt/presentation.xml><?xml version="1.0" encoding="utf-8"?>
 <p:presentation xmlns:a="http://schemas.openxmlformats.org/drawingml/2006/main" xmlns:r="http://schemas.openxmlformats.org/officeDocument/2006/relationships" xmlns:p="http://schemas.openxmlformats.org/presentationml/2006/main" saveSubsetFonts="1">
   <p:sldMasterIdLst>
-    <p:sldMasterId id="2147483672" r:id="rId1"/>
+    <p:sldMasterId id="2147483720" r:id="rId1"/>
   </p:sldMasterIdLst>
   <p:sldIdLst>
     <p:sldId id="256" r:id="rId2"/>
@@ -244,7 +244,7 @@
           <a:p>
             <a:fld id="{6A87B696-1102-4874-86CF-7F32C533EC34}" type="datetimeFigureOut">
               <a:rPr lang="es-MX" smtClean="0"/>
-              <a:t>04/07/2021</a:t>
+              <a:t>08/07/2021</a:t>
             </a:fld>
             <a:endParaRPr lang="es-MX"/>
           </a:p>
@@ -295,7 +295,7 @@
     </p:spTree>
     <p:extLst>
       <p:ext uri="{BB962C8B-B14F-4D97-AF65-F5344CB8AC3E}">
-        <p14:creationId xmlns:p14="http://schemas.microsoft.com/office/powerpoint/2010/main" val="3056712178"/>
+        <p14:creationId xmlns:p14="http://schemas.microsoft.com/office/powerpoint/2010/main" val="1835279299"/>
       </p:ext>
     </p:extLst>
   </p:cSld>
@@ -414,7 +414,7 @@
           <a:p>
             <a:fld id="{6A87B696-1102-4874-86CF-7F32C533EC34}" type="datetimeFigureOut">
               <a:rPr lang="es-MX" smtClean="0"/>
-              <a:t>04/07/2021</a:t>
+              <a:t>08/07/2021</a:t>
             </a:fld>
             <a:endParaRPr lang="es-MX"/>
           </a:p>
@@ -465,7 +465,7 @@
     </p:spTree>
     <p:extLst>
       <p:ext uri="{BB962C8B-B14F-4D97-AF65-F5344CB8AC3E}">
-        <p14:creationId xmlns:p14="http://schemas.microsoft.com/office/powerpoint/2010/main" val="1342536402"/>
+        <p14:creationId xmlns:p14="http://schemas.microsoft.com/office/powerpoint/2010/main" val="1504080417"/>
       </p:ext>
     </p:extLst>
   </p:cSld>
@@ -594,7 +594,7 @@
           <a:p>
             <a:fld id="{6A87B696-1102-4874-86CF-7F32C533EC34}" type="datetimeFigureOut">
               <a:rPr lang="es-MX" smtClean="0"/>
-              <a:t>04/07/2021</a:t>
+              <a:t>08/07/2021</a:t>
             </a:fld>
             <a:endParaRPr lang="es-MX"/>
           </a:p>
@@ -645,7 +645,7 @@
     </p:spTree>
     <p:extLst>
       <p:ext uri="{BB962C8B-B14F-4D97-AF65-F5344CB8AC3E}">
-        <p14:creationId xmlns:p14="http://schemas.microsoft.com/office/powerpoint/2010/main" val="3704929626"/>
+        <p14:creationId xmlns:p14="http://schemas.microsoft.com/office/powerpoint/2010/main" val="1256867051"/>
       </p:ext>
     </p:extLst>
   </p:cSld>
@@ -764,7 +764,7 @@
           <a:p>
             <a:fld id="{6A87B696-1102-4874-86CF-7F32C533EC34}" type="datetimeFigureOut">
               <a:rPr lang="es-MX" smtClean="0"/>
-              <a:t>04/07/2021</a:t>
+              <a:t>08/07/2021</a:t>
             </a:fld>
             <a:endParaRPr lang="es-MX"/>
           </a:p>
@@ -815,7 +815,7 @@
     </p:spTree>
     <p:extLst>
       <p:ext uri="{BB962C8B-B14F-4D97-AF65-F5344CB8AC3E}">
-        <p14:creationId xmlns:p14="http://schemas.microsoft.com/office/powerpoint/2010/main" val="1993020646"/>
+        <p14:creationId xmlns:p14="http://schemas.microsoft.com/office/powerpoint/2010/main" val="2185022460"/>
       </p:ext>
     </p:extLst>
   </p:cSld>
@@ -1008,7 +1008,7 @@
           <a:p>
             <a:fld id="{6A87B696-1102-4874-86CF-7F32C533EC34}" type="datetimeFigureOut">
               <a:rPr lang="es-MX" smtClean="0"/>
-              <a:t>04/07/2021</a:t>
+              <a:t>08/07/2021</a:t>
             </a:fld>
             <a:endParaRPr lang="es-MX"/>
           </a:p>
@@ -1059,7 +1059,7 @@
     </p:spTree>
     <p:extLst>
       <p:ext uri="{BB962C8B-B14F-4D97-AF65-F5344CB8AC3E}">
-        <p14:creationId xmlns:p14="http://schemas.microsoft.com/office/powerpoint/2010/main" val="3299621296"/>
+        <p14:creationId xmlns:p14="http://schemas.microsoft.com/office/powerpoint/2010/main" val="3810252334"/>
       </p:ext>
     </p:extLst>
   </p:cSld>
@@ -1240,7 +1240,7 @@
           <a:p>
             <a:fld id="{6A87B696-1102-4874-86CF-7F32C533EC34}" type="datetimeFigureOut">
               <a:rPr lang="es-MX" smtClean="0"/>
-              <a:t>04/07/2021</a:t>
+              <a:t>08/07/2021</a:t>
             </a:fld>
             <a:endParaRPr lang="es-MX"/>
           </a:p>
@@ -1291,7 +1291,7 @@
     </p:spTree>
     <p:extLst>
       <p:ext uri="{BB962C8B-B14F-4D97-AF65-F5344CB8AC3E}">
-        <p14:creationId xmlns:p14="http://schemas.microsoft.com/office/powerpoint/2010/main" val="3946451729"/>
+        <p14:creationId xmlns:p14="http://schemas.microsoft.com/office/powerpoint/2010/main" val="1667368787"/>
       </p:ext>
     </p:extLst>
   </p:cSld>
@@ -1607,7 +1607,7 @@
           <a:p>
             <a:fld id="{6A87B696-1102-4874-86CF-7F32C533EC34}" type="datetimeFigureOut">
               <a:rPr lang="es-MX" smtClean="0"/>
-              <a:t>04/07/2021</a:t>
+              <a:t>08/07/2021</a:t>
             </a:fld>
             <a:endParaRPr lang="es-MX"/>
           </a:p>
@@ -1658,7 +1658,7 @@
     </p:spTree>
     <p:extLst>
       <p:ext uri="{BB962C8B-B14F-4D97-AF65-F5344CB8AC3E}">
-        <p14:creationId xmlns:p14="http://schemas.microsoft.com/office/powerpoint/2010/main" val="1851868282"/>
+        <p14:creationId xmlns:p14="http://schemas.microsoft.com/office/powerpoint/2010/main" val="1728324666"/>
       </p:ext>
     </p:extLst>
   </p:cSld>
@@ -1725,7 +1725,7 @@
           <a:p>
             <a:fld id="{6A87B696-1102-4874-86CF-7F32C533EC34}" type="datetimeFigureOut">
               <a:rPr lang="es-MX" smtClean="0"/>
-              <a:t>04/07/2021</a:t>
+              <a:t>08/07/2021</a:t>
             </a:fld>
             <a:endParaRPr lang="es-MX"/>
           </a:p>
@@ -1776,7 +1776,7 @@
     </p:spTree>
     <p:extLst>
       <p:ext uri="{BB962C8B-B14F-4D97-AF65-F5344CB8AC3E}">
-        <p14:creationId xmlns:p14="http://schemas.microsoft.com/office/powerpoint/2010/main" val="1234995692"/>
+        <p14:creationId xmlns:p14="http://schemas.microsoft.com/office/powerpoint/2010/main" val="3394800791"/>
       </p:ext>
     </p:extLst>
   </p:cSld>
@@ -1820,7 +1820,7 @@
           <a:p>
             <a:fld id="{6A87B696-1102-4874-86CF-7F32C533EC34}" type="datetimeFigureOut">
               <a:rPr lang="es-MX" smtClean="0"/>
-              <a:t>04/07/2021</a:t>
+              <a:t>08/07/2021</a:t>
             </a:fld>
             <a:endParaRPr lang="es-MX"/>
           </a:p>
@@ -1871,7 +1871,7 @@
     </p:spTree>
     <p:extLst>
       <p:ext uri="{BB962C8B-B14F-4D97-AF65-F5344CB8AC3E}">
-        <p14:creationId xmlns:p14="http://schemas.microsoft.com/office/powerpoint/2010/main" val="3339106397"/>
+        <p14:creationId xmlns:p14="http://schemas.microsoft.com/office/powerpoint/2010/main" val="1969676114"/>
       </p:ext>
     </p:extLst>
   </p:cSld>
@@ -2097,7 +2097,7 @@
           <a:p>
             <a:fld id="{6A87B696-1102-4874-86CF-7F32C533EC34}" type="datetimeFigureOut">
               <a:rPr lang="es-MX" smtClean="0"/>
-              <a:t>04/07/2021</a:t>
+              <a:t>08/07/2021</a:t>
             </a:fld>
             <a:endParaRPr lang="es-MX"/>
           </a:p>
@@ -2148,7 +2148,7 @@
     </p:spTree>
     <p:extLst>
       <p:ext uri="{BB962C8B-B14F-4D97-AF65-F5344CB8AC3E}">
-        <p14:creationId xmlns:p14="http://schemas.microsoft.com/office/powerpoint/2010/main" val="2635053774"/>
+        <p14:creationId xmlns:p14="http://schemas.microsoft.com/office/powerpoint/2010/main" val="418336427"/>
       </p:ext>
     </p:extLst>
   </p:cSld>
@@ -2354,7 +2354,7 @@
           <a:p>
             <a:fld id="{6A87B696-1102-4874-86CF-7F32C533EC34}" type="datetimeFigureOut">
               <a:rPr lang="es-MX" smtClean="0"/>
-              <a:t>04/07/2021</a:t>
+              <a:t>08/07/2021</a:t>
             </a:fld>
             <a:endParaRPr lang="es-MX"/>
           </a:p>
@@ -2405,7 +2405,7 @@
     </p:spTree>
     <p:extLst>
       <p:ext uri="{BB962C8B-B14F-4D97-AF65-F5344CB8AC3E}">
-        <p14:creationId xmlns:p14="http://schemas.microsoft.com/office/powerpoint/2010/main" val="3402078476"/>
+        <p14:creationId xmlns:p14="http://schemas.microsoft.com/office/powerpoint/2010/main" val="2892714922"/>
       </p:ext>
     </p:extLst>
   </p:cSld>
@@ -2567,7 +2567,7 @@
           <a:p>
             <a:fld id="{6A87B696-1102-4874-86CF-7F32C533EC34}" type="datetimeFigureOut">
               <a:rPr lang="es-MX" smtClean="0"/>
-              <a:t>04/07/2021</a:t>
+              <a:t>08/07/2021</a:t>
             </a:fld>
             <a:endParaRPr lang="es-MX"/>
           </a:p>
@@ -2654,23 +2654,23 @@
     </p:spTree>
     <p:extLst>
       <p:ext uri="{BB962C8B-B14F-4D97-AF65-F5344CB8AC3E}">
-        <p14:creationId xmlns:p14="http://schemas.microsoft.com/office/powerpoint/2010/main" val="762014119"/>
+        <p14:creationId xmlns:p14="http://schemas.microsoft.com/office/powerpoint/2010/main" val="1379390606"/>
       </p:ext>
     </p:extLst>
   </p:cSld>
   <p:clrMap bg1="lt1" tx1="dk1" bg2="lt2" tx2="dk2" accent1="accent1" accent2="accent2" accent3="accent3" accent4="accent4" accent5="accent5" accent6="accent6" hlink="hlink" folHlink="folHlink"/>
   <p:sldLayoutIdLst>
-    <p:sldLayoutId id="2147483673" r:id="rId1"/>
-    <p:sldLayoutId id="2147483674" r:id="rId2"/>
-    <p:sldLayoutId id="2147483675" r:id="rId3"/>
-    <p:sldLayoutId id="2147483676" r:id="rId4"/>
-    <p:sldLayoutId id="2147483677" r:id="rId5"/>
-    <p:sldLayoutId id="2147483678" r:id="rId6"/>
-    <p:sldLayoutId id="2147483679" r:id="rId7"/>
-    <p:sldLayoutId id="2147483680" r:id="rId8"/>
-    <p:sldLayoutId id="2147483681" r:id="rId9"/>
-    <p:sldLayoutId id="2147483682" r:id="rId10"/>
-    <p:sldLayoutId id="2147483683" r:id="rId11"/>
+    <p:sldLayoutId id="2147483721" r:id="rId1"/>
+    <p:sldLayoutId id="2147483722" r:id="rId2"/>
+    <p:sldLayoutId id="2147483723" r:id="rId3"/>
+    <p:sldLayoutId id="2147483724" r:id="rId4"/>
+    <p:sldLayoutId id="2147483725" r:id="rId5"/>
+    <p:sldLayoutId id="2147483726" r:id="rId6"/>
+    <p:sldLayoutId id="2147483727" r:id="rId7"/>
+    <p:sldLayoutId id="2147483728" r:id="rId8"/>
+    <p:sldLayoutId id="2147483729" r:id="rId9"/>
+    <p:sldLayoutId id="2147483730" r:id="rId10"/>
+    <p:sldLayoutId id="2147483731" r:id="rId11"/>
   </p:sldLayoutIdLst>
   <p:txStyles>
     <p:titleStyle>
@@ -3604,13 +3604,13 @@
           <p:nvPr>
             <p:extLst>
               <p:ext uri="{D42A27DB-BD31-4B8C-83A1-F6EECF244321}">
-                <p14:modId xmlns:p14="http://schemas.microsoft.com/office/powerpoint/2010/main" val="372667309"/>
+                <p14:modId xmlns:p14="http://schemas.microsoft.com/office/powerpoint/2010/main" val="1617081297"/>
               </p:ext>
             </p:extLst>
           </p:nvPr>
         </p:nvGraphicFramePr>
         <p:xfrm>
-          <a:off x="827438" y="848985"/>
+          <a:off x="6522321" y="831400"/>
           <a:ext cx="3042821" cy="9758118"/>
         </p:xfrm>
         <a:graphic>
@@ -3845,7 +3845,11 @@
                     <a:lstStyle/>
                     <a:p>
                       <a:r>
-                        <a:rPr lang="en-US" sz="2100" noProof="1"/>
+                        <a:rPr lang="en-US" sz="2100" noProof="1">
+                          <a:solidFill>
+                            <a:srgbClr val="FF0000"/>
+                          </a:solidFill>
+                        </a:rPr>
                         <a:t>i94res</a:t>
                       </a:r>
                     </a:p>
@@ -3865,7 +3869,11 @@
                     <a:lstStyle/>
                     <a:p>
                       <a:r>
-                        <a:rPr lang="en-US" sz="2100" noProof="1"/>
+                        <a:rPr lang="en-US" sz="2100" noProof="1">
+                          <a:solidFill>
+                            <a:srgbClr val="FF0000"/>
+                          </a:solidFill>
+                        </a:rPr>
                         <a:t>i94port</a:t>
                       </a:r>
                     </a:p>
@@ -3925,7 +3933,11 @@
                     <a:lstStyle/>
                     <a:p>
                       <a:r>
-                        <a:rPr lang="en-US" sz="2100" noProof="1"/>
+                        <a:rPr lang="en-US" sz="2100" noProof="1">
+                          <a:solidFill>
+                            <a:srgbClr val="FF0000"/>
+                          </a:solidFill>
+                        </a:rPr>
                         <a:t>i94addr</a:t>
                       </a:r>
                     </a:p>
@@ -4197,13 +4209,13 @@
           <p:nvPr>
             <p:extLst>
               <p:ext uri="{D42A27DB-BD31-4B8C-83A1-F6EECF244321}">
-                <p14:modId xmlns:p14="http://schemas.microsoft.com/office/powerpoint/2010/main" val="2488081966"/>
+                <p14:modId xmlns:p14="http://schemas.microsoft.com/office/powerpoint/2010/main" val="2504158491"/>
               </p:ext>
             </p:extLst>
           </p:nvPr>
         </p:nvGraphicFramePr>
         <p:xfrm>
-          <a:off x="4246770" y="848985"/>
+          <a:off x="2462730" y="6115310"/>
           <a:ext cx="3042821" cy="5939724"/>
         </p:xfrm>
         <a:graphic>
@@ -4309,7 +4321,7 @@
                       <a:r>
                         <a:rPr lang="en-US" sz="2100" noProof="1">
                           <a:solidFill>
-                            <a:srgbClr val="FF0000"/>
+                            <a:schemeClr val="tx1"/>
                           </a:solidFill>
                         </a:rPr>
                         <a:t>city</a:t>
@@ -4348,7 +4360,11 @@
                         <a:defRPr/>
                       </a:pPr>
                       <a:r>
-                        <a:rPr lang="en-US" sz="2100" noProof="1"/>
+                        <a:rPr lang="en-US" sz="2100" noProof="1">
+                          <a:solidFill>
+                            <a:srgbClr val="FF0000"/>
+                          </a:solidFill>
+                        </a:rPr>
                         <a:t>state</a:t>
                       </a:r>
                     </a:p>
@@ -4601,335 +4617,6 @@
       </p:graphicFrame>
       <p:graphicFrame>
         <p:nvGraphicFramePr>
-          <p:cNvPr id="20" name="Tabla 19">
-            <a:extLst>
-              <a:ext uri="{FF2B5EF4-FFF2-40B4-BE49-F238E27FC236}">
-                <a16:creationId xmlns:a16="http://schemas.microsoft.com/office/drawing/2014/main" id="{394FF825-D46D-46DD-85BF-7DEDEE811B29}"/>
-              </a:ext>
-            </a:extLst>
-          </p:cNvPr>
-          <p:cNvGraphicFramePr>
-            <a:graphicFrameLocks noGrp="1"/>
-          </p:cNvGraphicFramePr>
-          <p:nvPr>
-            <p:extLst>
-              <p:ext uri="{D42A27DB-BD31-4B8C-83A1-F6EECF244321}">
-                <p14:modId xmlns:p14="http://schemas.microsoft.com/office/powerpoint/2010/main" val="1359000548"/>
-              </p:ext>
-            </p:extLst>
-          </p:nvPr>
-        </p:nvGraphicFramePr>
-        <p:xfrm>
-          <a:off x="11085434" y="848985"/>
-          <a:ext cx="3042821" cy="4242660"/>
-        </p:xfrm>
-        <a:graphic>
-          <a:graphicData uri="http://schemas.openxmlformats.org/drawingml/2006/table">
-            <a:tbl>
-              <a:tblPr firstRow="1" bandRow="1">
-                <a:tableStyleId>{5C22544A-7EE6-4342-B048-85BDC9FD1C3A}</a:tableStyleId>
-              </a:tblPr>
-              <a:tblGrid>
-                <a:gridCol w="3042821">
-                  <a:extLst>
-                    <a:ext uri="{9D8B030D-6E8A-4147-A177-3AD203B41FA5}">
-                      <a16:colId xmlns:a16="http://schemas.microsoft.com/office/drawing/2014/main" val="725001771"/>
-                    </a:ext>
-                  </a:extLst>
-                </a:gridCol>
-              </a:tblGrid>
-              <a:tr h="416903">
-                <a:tc>
-                  <a:txBody>
-                    <a:bodyPr/>
-                    <a:lstStyle/>
-                    <a:p>
-                      <a:pPr algn="ctr"/>
-                      <a:r>
-                        <a:rPr lang="en-US" sz="2100" noProof="1"/>
-                        <a:t>airports</a:t>
-                      </a:r>
-                    </a:p>
-                  </a:txBody>
-                  <a:tcPr marL="104226" marR="104226" marT="52113" marB="52113"/>
-                </a:tc>
-                <a:extLst>
-                  <a:ext uri="{0D108BD9-81ED-4DB2-BD59-A6C34878D82A}">
-                    <a16:rowId xmlns:a16="http://schemas.microsoft.com/office/drawing/2014/main" val="2497709565"/>
-                  </a:ext>
-                </a:extLst>
-              </a:tr>
-              <a:tr h="416903">
-                <a:tc>
-                  <a:txBody>
-                    <a:bodyPr/>
-                    <a:lstStyle/>
-                    <a:p>
-                      <a:pPr marL="0" marR="0" lvl="0" indent="0" algn="l" defTabSz="1394460" rtl="0" eaLnBrk="1" fontAlgn="auto" latinLnBrk="0" hangingPunct="1">
-                        <a:lnSpc>
-                          <a:spcPct val="100000"/>
-                        </a:lnSpc>
-                        <a:spcBef>
-                          <a:spcPts val="0"/>
-                        </a:spcBef>
-                        <a:spcAft>
-                          <a:spcPts val="0"/>
-                        </a:spcAft>
-                        <a:buClrTx/>
-                        <a:buSzTx/>
-                        <a:buFontTx/>
-                        <a:buNone/>
-                        <a:tabLst/>
-                        <a:defRPr/>
-                      </a:pPr>
-                      <a:r>
-                        <a:rPr lang="en-US" sz="2100" noProof="1"/>
-                        <a:t>air_idx</a:t>
-                      </a:r>
-                    </a:p>
-                  </a:txBody>
-                  <a:tcPr marL="104226" marR="104226" marT="52113" marB="52113"/>
-                </a:tc>
-                <a:extLst>
-                  <a:ext uri="{0D108BD9-81ED-4DB2-BD59-A6C34878D82A}">
-                    <a16:rowId xmlns:a16="http://schemas.microsoft.com/office/drawing/2014/main" val="3090355783"/>
-                  </a:ext>
-                </a:extLst>
-              </a:tr>
-              <a:tr h="416903">
-                <a:tc>
-                  <a:txBody>
-                    <a:bodyPr/>
-                    <a:lstStyle/>
-                    <a:p>
-                      <a:pPr marL="0" marR="0" lvl="0" indent="0" algn="l" defTabSz="1394460" rtl="0" eaLnBrk="1" fontAlgn="auto" latinLnBrk="0" hangingPunct="1">
-                        <a:lnSpc>
-                          <a:spcPct val="100000"/>
-                        </a:lnSpc>
-                        <a:spcBef>
-                          <a:spcPts val="0"/>
-                        </a:spcBef>
-                        <a:spcAft>
-                          <a:spcPts val="0"/>
-                        </a:spcAft>
-                        <a:buClrTx/>
-                        <a:buSzTx/>
-                        <a:buFontTx/>
-                        <a:buNone/>
-                        <a:tabLst/>
-                        <a:defRPr/>
-                      </a:pPr>
-                      <a:r>
-                        <a:rPr lang="en-US" sz="2100" noProof="1"/>
-                        <a:t>ident</a:t>
-                      </a:r>
-                    </a:p>
-                  </a:txBody>
-                  <a:tcPr marL="104226" marR="104226" marT="52113" marB="52113"/>
-                </a:tc>
-                <a:extLst>
-                  <a:ext uri="{0D108BD9-81ED-4DB2-BD59-A6C34878D82A}">
-                    <a16:rowId xmlns:a16="http://schemas.microsoft.com/office/drawing/2014/main" val="1499575497"/>
-                  </a:ext>
-                </a:extLst>
-              </a:tr>
-              <a:tr h="416903">
-                <a:tc>
-                  <a:txBody>
-                    <a:bodyPr/>
-                    <a:lstStyle/>
-                    <a:p>
-                      <a:pPr marL="0" marR="0" lvl="0" indent="0" algn="l" defTabSz="1394460" rtl="0" eaLnBrk="1" fontAlgn="auto" latinLnBrk="0" hangingPunct="1">
-                        <a:lnSpc>
-                          <a:spcPct val="100000"/>
-                        </a:lnSpc>
-                        <a:spcBef>
-                          <a:spcPts val="0"/>
-                        </a:spcBef>
-                        <a:spcAft>
-                          <a:spcPts val="0"/>
-                        </a:spcAft>
-                        <a:buClrTx/>
-                        <a:buSzTx/>
-                        <a:buFontTx/>
-                        <a:buNone/>
-                        <a:tabLst/>
-                        <a:defRPr/>
-                      </a:pPr>
-                      <a:r>
-                        <a:rPr lang="en-US" sz="2100" noProof="1"/>
-                        <a:t>type</a:t>
-                      </a:r>
-                    </a:p>
-                  </a:txBody>
-                  <a:tcPr marL="104226" marR="104226" marT="52113" marB="52113"/>
-                </a:tc>
-                <a:extLst>
-                  <a:ext uri="{0D108BD9-81ED-4DB2-BD59-A6C34878D82A}">
-                    <a16:rowId xmlns:a16="http://schemas.microsoft.com/office/drawing/2014/main" val="272324058"/>
-                  </a:ext>
-                </a:extLst>
-              </a:tr>
-              <a:tr h="416903">
-                <a:tc>
-                  <a:txBody>
-                    <a:bodyPr/>
-                    <a:lstStyle/>
-                    <a:p>
-                      <a:pPr marL="0" marR="0" lvl="0" indent="0" algn="l" defTabSz="1394460" rtl="0" eaLnBrk="1" fontAlgn="auto" latinLnBrk="0" hangingPunct="1">
-                        <a:lnSpc>
-                          <a:spcPct val="100000"/>
-                        </a:lnSpc>
-                        <a:spcBef>
-                          <a:spcPts val="0"/>
-                        </a:spcBef>
-                        <a:spcAft>
-                          <a:spcPts val="0"/>
-                        </a:spcAft>
-                        <a:buClrTx/>
-                        <a:buSzTx/>
-                        <a:buFontTx/>
-                        <a:buNone/>
-                        <a:tabLst/>
-                        <a:defRPr/>
-                      </a:pPr>
-                      <a:r>
-                        <a:rPr lang="en-US" sz="2100" noProof="1"/>
-                        <a:t>name</a:t>
-                      </a:r>
-                    </a:p>
-                  </a:txBody>
-                  <a:tcPr marL="104226" marR="104226" marT="52113" marB="52113"/>
-                </a:tc>
-                <a:extLst>
-                  <a:ext uri="{0D108BD9-81ED-4DB2-BD59-A6C34878D82A}">
-                    <a16:rowId xmlns:a16="http://schemas.microsoft.com/office/drawing/2014/main" val="2585117394"/>
-                  </a:ext>
-                </a:extLst>
-              </a:tr>
-              <a:tr h="416903">
-                <a:tc>
-                  <a:txBody>
-                    <a:bodyPr/>
-                    <a:lstStyle/>
-                    <a:p>
-                      <a:pPr marL="0" marR="0" lvl="0" indent="0" algn="l" defTabSz="1394460" rtl="0" eaLnBrk="1" fontAlgn="auto" latinLnBrk="0" hangingPunct="1">
-                        <a:lnSpc>
-                          <a:spcPct val="100000"/>
-                        </a:lnSpc>
-                        <a:spcBef>
-                          <a:spcPts val="0"/>
-                        </a:spcBef>
-                        <a:spcAft>
-                          <a:spcPts val="0"/>
-                        </a:spcAft>
-                        <a:buClrTx/>
-                        <a:buSzTx/>
-                        <a:buFontTx/>
-                        <a:buNone/>
-                        <a:tabLst/>
-                        <a:defRPr/>
-                      </a:pPr>
-                      <a:r>
-                        <a:rPr lang="en-US" sz="2100" noProof="1"/>
-                        <a:t>elevation_ft</a:t>
-                      </a:r>
-                    </a:p>
-                  </a:txBody>
-                  <a:tcPr marL="104226" marR="104226" marT="52113" marB="52113"/>
-                </a:tc>
-                <a:extLst>
-                  <a:ext uri="{0D108BD9-81ED-4DB2-BD59-A6C34878D82A}">
-                    <a16:rowId xmlns:a16="http://schemas.microsoft.com/office/drawing/2014/main" val="2138592755"/>
-                  </a:ext>
-                </a:extLst>
-              </a:tr>
-              <a:tr h="416903">
-                <a:tc>
-                  <a:txBody>
-                    <a:bodyPr/>
-                    <a:lstStyle/>
-                    <a:p>
-                      <a:r>
-                        <a:rPr lang="en-US" sz="2100" noProof="1"/>
-                        <a:t>continent</a:t>
-                      </a:r>
-                    </a:p>
-                  </a:txBody>
-                  <a:tcPr marL="104226" marR="104226" marT="52113" marB="52113"/>
-                </a:tc>
-                <a:extLst>
-                  <a:ext uri="{0D108BD9-81ED-4DB2-BD59-A6C34878D82A}">
-                    <a16:rowId xmlns:a16="http://schemas.microsoft.com/office/drawing/2014/main" val="3226028401"/>
-                  </a:ext>
-                </a:extLst>
-              </a:tr>
-              <a:tr h="416903">
-                <a:tc>
-                  <a:txBody>
-                    <a:bodyPr/>
-                    <a:lstStyle/>
-                    <a:p>
-                      <a:r>
-                        <a:rPr lang="en-US" sz="2100" noProof="1"/>
-                        <a:t>iso_region</a:t>
-                      </a:r>
-                    </a:p>
-                  </a:txBody>
-                  <a:tcPr marL="104226" marR="104226" marT="52113" marB="52113"/>
-                </a:tc>
-                <a:extLst>
-                  <a:ext uri="{0D108BD9-81ED-4DB2-BD59-A6C34878D82A}">
-                    <a16:rowId xmlns:a16="http://schemas.microsoft.com/office/drawing/2014/main" val="1098580017"/>
-                  </a:ext>
-                </a:extLst>
-              </a:tr>
-              <a:tr h="416903">
-                <a:tc>
-                  <a:txBody>
-                    <a:bodyPr/>
-                    <a:lstStyle/>
-                    <a:p>
-                      <a:r>
-                        <a:rPr lang="en-US" sz="2100" noProof="1"/>
-                        <a:t>municipality</a:t>
-                      </a:r>
-                    </a:p>
-                  </a:txBody>
-                  <a:tcPr marL="104226" marR="104226" marT="52113" marB="52113"/>
-                </a:tc>
-                <a:extLst>
-                  <a:ext uri="{0D108BD9-81ED-4DB2-BD59-A6C34878D82A}">
-                    <a16:rowId xmlns:a16="http://schemas.microsoft.com/office/drawing/2014/main" val="581053769"/>
-                  </a:ext>
-                </a:extLst>
-              </a:tr>
-              <a:tr h="416903">
-                <a:tc>
-                  <a:txBody>
-                    <a:bodyPr/>
-                    <a:lstStyle/>
-                    <a:p>
-                      <a:r>
-                        <a:rPr lang="en-US" sz="2100" noProof="1"/>
-                        <a:t>coordinates</a:t>
-                      </a:r>
-                    </a:p>
-                  </a:txBody>
-                  <a:tcPr marL="104226" marR="104226" marT="52113" marB="52113"/>
-                </a:tc>
-                <a:extLst>
-                  <a:ext uri="{0D108BD9-81ED-4DB2-BD59-A6C34878D82A}">
-                    <a16:rowId xmlns:a16="http://schemas.microsoft.com/office/drawing/2014/main" val="7552704"/>
-                  </a:ext>
-                </a:extLst>
-              </a:tr>
-            </a:tbl>
-          </a:graphicData>
-        </a:graphic>
-      </p:graphicFrame>
-      <p:graphicFrame>
-        <p:nvGraphicFramePr>
           <p:cNvPr id="21" name="Tabla 20">
             <a:extLst>
               <a:ext uri="{FF2B5EF4-FFF2-40B4-BE49-F238E27FC236}">
@@ -4943,13 +4630,13 @@
           <p:nvPr>
             <p:extLst>
               <p:ext uri="{D42A27DB-BD31-4B8C-83A1-F6EECF244321}">
-                <p14:modId xmlns:p14="http://schemas.microsoft.com/office/powerpoint/2010/main" val="2097362857"/>
+                <p14:modId xmlns:p14="http://schemas.microsoft.com/office/powerpoint/2010/main" val="2761904271"/>
               </p:ext>
             </p:extLst>
           </p:nvPr>
         </p:nvGraphicFramePr>
         <p:xfrm>
-          <a:off x="7666102" y="852587"/>
+          <a:off x="10581913" y="5137809"/>
           <a:ext cx="3042821" cy="4138434"/>
         </p:xfrm>
         <a:graphic>
@@ -5162,7 +4849,7 @@
                       <a:r>
                         <a:rPr lang="en-US" sz="2100" noProof="1">
                           <a:solidFill>
-                            <a:srgbClr val="FF0000"/>
+                            <a:schemeClr val="tx1"/>
                           </a:solidFill>
                         </a:rPr>
                         <a:t>City</a:t>
@@ -5184,7 +4871,11 @@
                     <a:lstStyle/>
                     <a:p>
                       <a:r>
-                        <a:rPr lang="en-US" sz="2100" noProof="1"/>
+                        <a:rPr lang="en-US" sz="2100" noProof="1">
+                          <a:solidFill>
+                            <a:srgbClr val="FF0000"/>
+                          </a:solidFill>
+                        </a:rPr>
                         <a:t>Country</a:t>
                       </a:r>
                     </a:p>
@@ -5241,6 +4932,832 @@
           </a:graphicData>
         </a:graphic>
       </p:graphicFrame>
+      <p:graphicFrame>
+        <p:nvGraphicFramePr>
+          <p:cNvPr id="8" name="Tabla 7">
+            <a:extLst>
+              <a:ext uri="{FF2B5EF4-FFF2-40B4-BE49-F238E27FC236}">
+                <a16:creationId xmlns:a16="http://schemas.microsoft.com/office/drawing/2014/main" id="{A300E444-DC84-412B-B94A-AA11474FAD28}"/>
+              </a:ext>
+            </a:extLst>
+          </p:cNvPr>
+          <p:cNvGraphicFramePr>
+            <a:graphicFrameLocks noGrp="1"/>
+          </p:cNvGraphicFramePr>
+          <p:nvPr>
+            <p:extLst>
+              <p:ext uri="{D42A27DB-BD31-4B8C-83A1-F6EECF244321}">
+                <p14:modId xmlns:p14="http://schemas.microsoft.com/office/powerpoint/2010/main" val="13480134"/>
+              </p:ext>
+            </p:extLst>
+          </p:nvPr>
+        </p:nvGraphicFramePr>
+        <p:xfrm>
+          <a:off x="10581913" y="2435013"/>
+          <a:ext cx="3042821" cy="1697064"/>
+        </p:xfrm>
+        <a:graphic>
+          <a:graphicData uri="http://schemas.openxmlformats.org/drawingml/2006/table">
+            <a:tbl>
+              <a:tblPr firstRow="1" bandRow="1">
+                <a:tableStyleId>{5C22544A-7EE6-4342-B048-85BDC9FD1C3A}</a:tableStyleId>
+              </a:tblPr>
+              <a:tblGrid>
+                <a:gridCol w="3042821">
+                  <a:extLst>
+                    <a:ext uri="{9D8B030D-6E8A-4147-A177-3AD203B41FA5}">
+                      <a16:colId xmlns:a16="http://schemas.microsoft.com/office/drawing/2014/main" val="725001771"/>
+                    </a:ext>
+                  </a:extLst>
+                </a:gridCol>
+              </a:tblGrid>
+              <a:tr h="416903">
+                <a:tc>
+                  <a:txBody>
+                    <a:bodyPr/>
+                    <a:lstStyle/>
+                    <a:p>
+                      <a:pPr algn="ctr"/>
+                      <a:r>
+                        <a:rPr lang="en-US" sz="2100" noProof="1"/>
+                        <a:t>i94_residence</a:t>
+                      </a:r>
+                    </a:p>
+                  </a:txBody>
+                  <a:tcPr marL="104226" marR="104226" marT="52113" marB="52113"/>
+                </a:tc>
+                <a:extLst>
+                  <a:ext uri="{0D108BD9-81ED-4DB2-BD59-A6C34878D82A}">
+                    <a16:rowId xmlns:a16="http://schemas.microsoft.com/office/drawing/2014/main" val="2497709565"/>
+                  </a:ext>
+                </a:extLst>
+              </a:tr>
+              <a:tr h="416903">
+                <a:tc>
+                  <a:txBody>
+                    <a:bodyPr/>
+                    <a:lstStyle/>
+                    <a:p>
+                      <a:pPr marL="0" marR="0" lvl="0" indent="0" algn="l" defTabSz="1394460" rtl="0" eaLnBrk="1" fontAlgn="auto" latinLnBrk="0" hangingPunct="1">
+                        <a:lnSpc>
+                          <a:spcPct val="100000"/>
+                        </a:lnSpc>
+                        <a:spcBef>
+                          <a:spcPts val="0"/>
+                        </a:spcBef>
+                        <a:spcAft>
+                          <a:spcPts val="0"/>
+                        </a:spcAft>
+                        <a:buClrTx/>
+                        <a:buSzTx/>
+                        <a:buFontTx/>
+                        <a:buNone/>
+                        <a:tabLst/>
+                        <a:defRPr/>
+                      </a:pPr>
+                      <a:r>
+                        <a:rPr lang="en-US" sz="2100" noProof="1"/>
+                        <a:t>res_idx</a:t>
+                      </a:r>
+                    </a:p>
+                  </a:txBody>
+                  <a:tcPr marL="104226" marR="104226" marT="52113" marB="52113"/>
+                </a:tc>
+                <a:extLst>
+                  <a:ext uri="{0D108BD9-81ED-4DB2-BD59-A6C34878D82A}">
+                    <a16:rowId xmlns:a16="http://schemas.microsoft.com/office/drawing/2014/main" val="2750515207"/>
+                  </a:ext>
+                </a:extLst>
+              </a:tr>
+              <a:tr h="416903">
+                <a:tc>
+                  <a:txBody>
+                    <a:bodyPr/>
+                    <a:lstStyle/>
+                    <a:p>
+                      <a:pPr marL="0" marR="0" lvl="0" indent="0" algn="l" defTabSz="1394460" rtl="0" eaLnBrk="1" fontAlgn="auto" latinLnBrk="0" hangingPunct="1">
+                        <a:lnSpc>
+                          <a:spcPct val="100000"/>
+                        </a:lnSpc>
+                        <a:spcBef>
+                          <a:spcPts val="0"/>
+                        </a:spcBef>
+                        <a:spcAft>
+                          <a:spcPts val="0"/>
+                        </a:spcAft>
+                        <a:buClrTx/>
+                        <a:buSzTx/>
+                        <a:buFontTx/>
+                        <a:buNone/>
+                        <a:tabLst/>
+                        <a:defRPr/>
+                      </a:pPr>
+                      <a:r>
+                        <a:rPr lang="en-US" sz="2100" noProof="1">
+                          <a:solidFill>
+                            <a:srgbClr val="FF0000"/>
+                          </a:solidFill>
+                        </a:rPr>
+                        <a:t>i94cit_res</a:t>
+                      </a:r>
+                    </a:p>
+                  </a:txBody>
+                  <a:tcPr marL="104226" marR="104226" marT="52113" marB="52113"/>
+                </a:tc>
+                <a:extLst>
+                  <a:ext uri="{0D108BD9-81ED-4DB2-BD59-A6C34878D82A}">
+                    <a16:rowId xmlns:a16="http://schemas.microsoft.com/office/drawing/2014/main" val="1499575497"/>
+                  </a:ext>
+                </a:extLst>
+              </a:tr>
+              <a:tr h="416903">
+                <a:tc>
+                  <a:txBody>
+                    <a:bodyPr/>
+                    <a:lstStyle/>
+                    <a:p>
+                      <a:pPr marL="0" marR="0" lvl="0" indent="0" algn="l" defTabSz="1394460" rtl="0" eaLnBrk="1" fontAlgn="auto" latinLnBrk="0" hangingPunct="1">
+                        <a:lnSpc>
+                          <a:spcPct val="100000"/>
+                        </a:lnSpc>
+                        <a:spcBef>
+                          <a:spcPts val="0"/>
+                        </a:spcBef>
+                        <a:spcAft>
+                          <a:spcPts val="0"/>
+                        </a:spcAft>
+                        <a:buClrTx/>
+                        <a:buSzTx/>
+                        <a:buFontTx/>
+                        <a:buNone/>
+                        <a:tabLst/>
+                        <a:defRPr/>
+                      </a:pPr>
+                      <a:r>
+                        <a:rPr lang="en-US" sz="2100" noProof="1">
+                          <a:solidFill>
+                            <a:schemeClr val="tx1"/>
+                          </a:solidFill>
+                        </a:rPr>
+                        <a:t>country</a:t>
+                      </a:r>
+                    </a:p>
+                  </a:txBody>
+                  <a:tcPr marL="104226" marR="104226" marT="52113" marB="52113"/>
+                </a:tc>
+                <a:extLst>
+                  <a:ext uri="{0D108BD9-81ED-4DB2-BD59-A6C34878D82A}">
+                    <a16:rowId xmlns:a16="http://schemas.microsoft.com/office/drawing/2014/main" val="272324058"/>
+                  </a:ext>
+                </a:extLst>
+              </a:tr>
+            </a:tbl>
+          </a:graphicData>
+        </a:graphic>
+      </p:graphicFrame>
+      <p:graphicFrame>
+        <p:nvGraphicFramePr>
+          <p:cNvPr id="9" name="Tabla 8">
+            <a:extLst>
+              <a:ext uri="{FF2B5EF4-FFF2-40B4-BE49-F238E27FC236}">
+                <a16:creationId xmlns:a16="http://schemas.microsoft.com/office/drawing/2014/main" id="{2C30322F-13EC-481F-8422-11475D08C985}"/>
+              </a:ext>
+            </a:extLst>
+          </p:cNvPr>
+          <p:cNvGraphicFramePr>
+            <a:graphicFrameLocks noGrp="1"/>
+          </p:cNvGraphicFramePr>
+          <p:nvPr>
+            <p:extLst>
+              <p:ext uri="{D42A27DB-BD31-4B8C-83A1-F6EECF244321}">
+                <p14:modId xmlns:p14="http://schemas.microsoft.com/office/powerpoint/2010/main" val="2633818073"/>
+              </p:ext>
+            </p:extLst>
+          </p:nvPr>
+        </p:nvGraphicFramePr>
+        <p:xfrm>
+          <a:off x="2462731" y="1214328"/>
+          <a:ext cx="3042821" cy="1697064"/>
+        </p:xfrm>
+        <a:graphic>
+          <a:graphicData uri="http://schemas.openxmlformats.org/drawingml/2006/table">
+            <a:tbl>
+              <a:tblPr firstRow="1" bandRow="1">
+                <a:tableStyleId>{5C22544A-7EE6-4342-B048-85BDC9FD1C3A}</a:tableStyleId>
+              </a:tblPr>
+              <a:tblGrid>
+                <a:gridCol w="3042821">
+                  <a:extLst>
+                    <a:ext uri="{9D8B030D-6E8A-4147-A177-3AD203B41FA5}">
+                      <a16:colId xmlns:a16="http://schemas.microsoft.com/office/drawing/2014/main" val="725001771"/>
+                    </a:ext>
+                  </a:extLst>
+                </a:gridCol>
+              </a:tblGrid>
+              <a:tr h="416903">
+                <a:tc>
+                  <a:txBody>
+                    <a:bodyPr/>
+                    <a:lstStyle/>
+                    <a:p>
+                      <a:pPr algn="ctr"/>
+                      <a:r>
+                        <a:rPr lang="en-US" sz="2100" noProof="1"/>
+                        <a:t>i94_port_of_admission</a:t>
+                      </a:r>
+                    </a:p>
+                  </a:txBody>
+                  <a:tcPr marL="104226" marR="104226" marT="52113" marB="52113"/>
+                </a:tc>
+                <a:extLst>
+                  <a:ext uri="{0D108BD9-81ED-4DB2-BD59-A6C34878D82A}">
+                    <a16:rowId xmlns:a16="http://schemas.microsoft.com/office/drawing/2014/main" val="2497709565"/>
+                  </a:ext>
+                </a:extLst>
+              </a:tr>
+              <a:tr h="416903">
+                <a:tc>
+                  <a:txBody>
+                    <a:bodyPr/>
+                    <a:lstStyle/>
+                    <a:p>
+                      <a:pPr marL="0" marR="0" lvl="0" indent="0" algn="l" defTabSz="1394460" rtl="0" eaLnBrk="1" fontAlgn="auto" latinLnBrk="0" hangingPunct="1">
+                        <a:lnSpc>
+                          <a:spcPct val="100000"/>
+                        </a:lnSpc>
+                        <a:spcBef>
+                          <a:spcPts val="0"/>
+                        </a:spcBef>
+                        <a:spcAft>
+                          <a:spcPts val="0"/>
+                        </a:spcAft>
+                        <a:buClrTx/>
+                        <a:buSzTx/>
+                        <a:buFontTx/>
+                        <a:buNone/>
+                        <a:tabLst/>
+                        <a:defRPr/>
+                      </a:pPr>
+                      <a:r>
+                        <a:rPr lang="en-US" sz="2100" noProof="1"/>
+                        <a:t>por_idx</a:t>
+                      </a:r>
+                    </a:p>
+                  </a:txBody>
+                  <a:tcPr marL="104226" marR="104226" marT="52113" marB="52113"/>
+                </a:tc>
+                <a:extLst>
+                  <a:ext uri="{0D108BD9-81ED-4DB2-BD59-A6C34878D82A}">
+                    <a16:rowId xmlns:a16="http://schemas.microsoft.com/office/drawing/2014/main" val="2750515207"/>
+                  </a:ext>
+                </a:extLst>
+              </a:tr>
+              <a:tr h="416903">
+                <a:tc>
+                  <a:txBody>
+                    <a:bodyPr/>
+                    <a:lstStyle/>
+                    <a:p>
+                      <a:pPr marL="0" marR="0" lvl="0" indent="0" algn="l" defTabSz="1394460" rtl="0" eaLnBrk="1" fontAlgn="auto" latinLnBrk="0" hangingPunct="1">
+                        <a:lnSpc>
+                          <a:spcPct val="100000"/>
+                        </a:lnSpc>
+                        <a:spcBef>
+                          <a:spcPts val="0"/>
+                        </a:spcBef>
+                        <a:spcAft>
+                          <a:spcPts val="0"/>
+                        </a:spcAft>
+                        <a:buClrTx/>
+                        <a:buSzTx/>
+                        <a:buFontTx/>
+                        <a:buNone/>
+                        <a:tabLst/>
+                        <a:defRPr/>
+                      </a:pPr>
+                      <a:r>
+                        <a:rPr lang="en-US" sz="2100" noProof="1">
+                          <a:solidFill>
+                            <a:srgbClr val="FF0000"/>
+                          </a:solidFill>
+                        </a:rPr>
+                        <a:t>i94port</a:t>
+                      </a:r>
+                    </a:p>
+                  </a:txBody>
+                  <a:tcPr marL="104226" marR="104226" marT="52113" marB="52113"/>
+                </a:tc>
+                <a:extLst>
+                  <a:ext uri="{0D108BD9-81ED-4DB2-BD59-A6C34878D82A}">
+                    <a16:rowId xmlns:a16="http://schemas.microsoft.com/office/drawing/2014/main" val="1499575497"/>
+                  </a:ext>
+                </a:extLst>
+              </a:tr>
+              <a:tr h="416903">
+                <a:tc>
+                  <a:txBody>
+                    <a:bodyPr/>
+                    <a:lstStyle/>
+                    <a:p>
+                      <a:pPr marL="0" marR="0" lvl="0" indent="0" algn="l" defTabSz="1394460" rtl="0" eaLnBrk="1" fontAlgn="auto" latinLnBrk="0" hangingPunct="1">
+                        <a:lnSpc>
+                          <a:spcPct val="100000"/>
+                        </a:lnSpc>
+                        <a:spcBef>
+                          <a:spcPts val="0"/>
+                        </a:spcBef>
+                        <a:spcAft>
+                          <a:spcPts val="0"/>
+                        </a:spcAft>
+                        <a:buClrTx/>
+                        <a:buSzTx/>
+                        <a:buFontTx/>
+                        <a:buNone/>
+                        <a:tabLst/>
+                        <a:defRPr/>
+                      </a:pPr>
+                      <a:r>
+                        <a:rPr lang="en-US" sz="2100" noProof="1"/>
+                        <a:t>port</a:t>
+                      </a:r>
+                    </a:p>
+                  </a:txBody>
+                  <a:tcPr marL="104226" marR="104226" marT="52113" marB="52113"/>
+                </a:tc>
+                <a:extLst>
+                  <a:ext uri="{0D108BD9-81ED-4DB2-BD59-A6C34878D82A}">
+                    <a16:rowId xmlns:a16="http://schemas.microsoft.com/office/drawing/2014/main" val="272324058"/>
+                  </a:ext>
+                </a:extLst>
+              </a:tr>
+            </a:tbl>
+          </a:graphicData>
+        </a:graphic>
+      </p:graphicFrame>
+      <p:graphicFrame>
+        <p:nvGraphicFramePr>
+          <p:cNvPr id="10" name="Tabla 9">
+            <a:extLst>
+              <a:ext uri="{FF2B5EF4-FFF2-40B4-BE49-F238E27FC236}">
+                <a16:creationId xmlns:a16="http://schemas.microsoft.com/office/drawing/2014/main" id="{2E379765-3CF6-4305-A264-60A3F5AB909C}"/>
+              </a:ext>
+            </a:extLst>
+          </p:cNvPr>
+          <p:cNvGraphicFramePr>
+            <a:graphicFrameLocks noGrp="1"/>
+          </p:cNvGraphicFramePr>
+          <p:nvPr>
+            <p:extLst>
+              <p:ext uri="{D42A27DB-BD31-4B8C-83A1-F6EECF244321}">
+                <p14:modId xmlns:p14="http://schemas.microsoft.com/office/powerpoint/2010/main" val="498064330"/>
+              </p:ext>
+            </p:extLst>
+          </p:nvPr>
+        </p:nvGraphicFramePr>
+        <p:xfrm>
+          <a:off x="2462730" y="3817219"/>
+          <a:ext cx="3042821" cy="1697064"/>
+        </p:xfrm>
+        <a:graphic>
+          <a:graphicData uri="http://schemas.openxmlformats.org/drawingml/2006/table">
+            <a:tbl>
+              <a:tblPr firstRow="1" bandRow="1">
+                <a:tableStyleId>{5C22544A-7EE6-4342-B048-85BDC9FD1C3A}</a:tableStyleId>
+              </a:tblPr>
+              <a:tblGrid>
+                <a:gridCol w="3042821">
+                  <a:extLst>
+                    <a:ext uri="{9D8B030D-6E8A-4147-A177-3AD203B41FA5}">
+                      <a16:colId xmlns:a16="http://schemas.microsoft.com/office/drawing/2014/main" val="725001771"/>
+                    </a:ext>
+                  </a:extLst>
+                </a:gridCol>
+              </a:tblGrid>
+              <a:tr h="416903">
+                <a:tc>
+                  <a:txBody>
+                    <a:bodyPr/>
+                    <a:lstStyle/>
+                    <a:p>
+                      <a:pPr algn="ctr"/>
+                      <a:r>
+                        <a:rPr lang="en-US" sz="2100" noProof="1"/>
+                        <a:t>i94_usa_state_arrival</a:t>
+                      </a:r>
+                    </a:p>
+                  </a:txBody>
+                  <a:tcPr marL="104226" marR="104226" marT="52113" marB="52113"/>
+                </a:tc>
+                <a:extLst>
+                  <a:ext uri="{0D108BD9-81ED-4DB2-BD59-A6C34878D82A}">
+                    <a16:rowId xmlns:a16="http://schemas.microsoft.com/office/drawing/2014/main" val="2497709565"/>
+                  </a:ext>
+                </a:extLst>
+              </a:tr>
+              <a:tr h="416903">
+                <a:tc>
+                  <a:txBody>
+                    <a:bodyPr/>
+                    <a:lstStyle/>
+                    <a:p>
+                      <a:pPr marL="0" marR="0" lvl="0" indent="0" algn="l" defTabSz="1394460" rtl="0" eaLnBrk="1" fontAlgn="auto" latinLnBrk="0" hangingPunct="1">
+                        <a:lnSpc>
+                          <a:spcPct val="100000"/>
+                        </a:lnSpc>
+                        <a:spcBef>
+                          <a:spcPts val="0"/>
+                        </a:spcBef>
+                        <a:spcAft>
+                          <a:spcPts val="0"/>
+                        </a:spcAft>
+                        <a:buClrTx/>
+                        <a:buSzTx/>
+                        <a:buFontTx/>
+                        <a:buNone/>
+                        <a:tabLst/>
+                        <a:defRPr/>
+                      </a:pPr>
+                      <a:r>
+                        <a:rPr lang="en-US" sz="2100" noProof="1"/>
+                        <a:t>arr_idx</a:t>
+                      </a:r>
+                    </a:p>
+                  </a:txBody>
+                  <a:tcPr marL="104226" marR="104226" marT="52113" marB="52113"/>
+                </a:tc>
+                <a:extLst>
+                  <a:ext uri="{0D108BD9-81ED-4DB2-BD59-A6C34878D82A}">
+                    <a16:rowId xmlns:a16="http://schemas.microsoft.com/office/drawing/2014/main" val="2750515207"/>
+                  </a:ext>
+                </a:extLst>
+              </a:tr>
+              <a:tr h="416903">
+                <a:tc>
+                  <a:txBody>
+                    <a:bodyPr/>
+                    <a:lstStyle/>
+                    <a:p>
+                      <a:pPr marL="0" marR="0" lvl="0" indent="0" algn="l" defTabSz="1394460" rtl="0" eaLnBrk="1" fontAlgn="auto" latinLnBrk="0" hangingPunct="1">
+                        <a:lnSpc>
+                          <a:spcPct val="100000"/>
+                        </a:lnSpc>
+                        <a:spcBef>
+                          <a:spcPts val="0"/>
+                        </a:spcBef>
+                        <a:spcAft>
+                          <a:spcPts val="0"/>
+                        </a:spcAft>
+                        <a:buClrTx/>
+                        <a:buSzTx/>
+                        <a:buFontTx/>
+                        <a:buNone/>
+                        <a:tabLst/>
+                        <a:defRPr/>
+                      </a:pPr>
+                      <a:r>
+                        <a:rPr lang="en-US" sz="2100" noProof="1">
+                          <a:solidFill>
+                            <a:srgbClr val="FF0000"/>
+                          </a:solidFill>
+                        </a:rPr>
+                        <a:t>i94addr</a:t>
+                      </a:r>
+                    </a:p>
+                  </a:txBody>
+                  <a:tcPr marL="104226" marR="104226" marT="52113" marB="52113"/>
+                </a:tc>
+                <a:extLst>
+                  <a:ext uri="{0D108BD9-81ED-4DB2-BD59-A6C34878D82A}">
+                    <a16:rowId xmlns:a16="http://schemas.microsoft.com/office/drawing/2014/main" val="1499575497"/>
+                  </a:ext>
+                </a:extLst>
+              </a:tr>
+              <a:tr h="416903">
+                <a:tc>
+                  <a:txBody>
+                    <a:bodyPr/>
+                    <a:lstStyle/>
+                    <a:p>
+                      <a:pPr marL="0" marR="0" lvl="0" indent="0" algn="l" defTabSz="1394460" rtl="0" eaLnBrk="1" fontAlgn="auto" latinLnBrk="0" hangingPunct="1">
+                        <a:lnSpc>
+                          <a:spcPct val="100000"/>
+                        </a:lnSpc>
+                        <a:spcBef>
+                          <a:spcPts val="0"/>
+                        </a:spcBef>
+                        <a:spcAft>
+                          <a:spcPts val="0"/>
+                        </a:spcAft>
+                        <a:buClrTx/>
+                        <a:buSzTx/>
+                        <a:buFontTx/>
+                        <a:buNone/>
+                        <a:tabLst/>
+                        <a:defRPr/>
+                      </a:pPr>
+                      <a:r>
+                        <a:rPr lang="en-US" sz="2100" noProof="1"/>
+                        <a:t>state</a:t>
+                      </a:r>
+                    </a:p>
+                  </a:txBody>
+                  <a:tcPr marL="104226" marR="104226" marT="52113" marB="52113"/>
+                </a:tc>
+                <a:extLst>
+                  <a:ext uri="{0D108BD9-81ED-4DB2-BD59-A6C34878D82A}">
+                    <a16:rowId xmlns:a16="http://schemas.microsoft.com/office/drawing/2014/main" val="272324058"/>
+                  </a:ext>
+                </a:extLst>
+              </a:tr>
+            </a:tbl>
+          </a:graphicData>
+        </a:graphic>
+      </p:graphicFrame>
+      <p:grpSp>
+        <p:nvGrpSpPr>
+          <p:cNvPr id="30" name="Grupo 29">
+            <a:extLst>
+              <a:ext uri="{FF2B5EF4-FFF2-40B4-BE49-F238E27FC236}">
+                <a16:creationId xmlns:a16="http://schemas.microsoft.com/office/drawing/2014/main" id="{F0DBCFD4-97ED-4A4F-8990-25EFDFD455E5}"/>
+              </a:ext>
+            </a:extLst>
+          </p:cNvPr>
+          <p:cNvGrpSpPr/>
+          <p:nvPr/>
+        </p:nvGrpSpPr>
+        <p:grpSpPr>
+          <a:xfrm>
+            <a:off x="5505551" y="2215260"/>
+            <a:ext cx="982335" cy="1601959"/>
+            <a:chOff x="5505551" y="2215260"/>
+            <a:chExt cx="982335" cy="1601959"/>
+          </a:xfrm>
+        </p:grpSpPr>
+        <p:cxnSp>
+          <p:nvCxnSpPr>
+            <p:cNvPr id="25" name="Conector recto 24">
+              <a:extLst>
+                <a:ext uri="{FF2B5EF4-FFF2-40B4-BE49-F238E27FC236}">
+                  <a16:creationId xmlns:a16="http://schemas.microsoft.com/office/drawing/2014/main" id="{9674C7B3-BFDF-4B14-B7AE-7E4A03C2D97E}"/>
+                </a:ext>
+              </a:extLst>
+            </p:cNvPr>
+            <p:cNvCxnSpPr/>
+            <p:nvPr/>
+          </p:nvCxnSpPr>
+          <p:spPr>
+            <a:xfrm>
+              <a:off x="5505551" y="2215260"/>
+              <a:ext cx="590449" cy="0"/>
+            </a:xfrm>
+            <a:prstGeom prst="line">
+              <a:avLst/>
+            </a:prstGeom>
+          </p:spPr>
+          <p:style>
+            <a:lnRef idx="1">
+              <a:schemeClr val="accent1"/>
+            </a:lnRef>
+            <a:fillRef idx="0">
+              <a:schemeClr val="accent1"/>
+            </a:fillRef>
+            <a:effectRef idx="0">
+              <a:schemeClr val="accent1"/>
+            </a:effectRef>
+            <a:fontRef idx="minor">
+              <a:schemeClr val="tx1"/>
+            </a:fontRef>
+          </p:style>
+        </p:cxnSp>
+        <p:cxnSp>
+          <p:nvCxnSpPr>
+            <p:cNvPr id="27" name="Conector recto 26">
+              <a:extLst>
+                <a:ext uri="{FF2B5EF4-FFF2-40B4-BE49-F238E27FC236}">
+                  <a16:creationId xmlns:a16="http://schemas.microsoft.com/office/drawing/2014/main" id="{B0896BCB-5297-4DA3-A24D-D9F461C90FD6}"/>
+                </a:ext>
+              </a:extLst>
+            </p:cNvPr>
+            <p:cNvCxnSpPr/>
+            <p:nvPr/>
+          </p:nvCxnSpPr>
+          <p:spPr>
+            <a:xfrm>
+              <a:off x="6081486" y="2215260"/>
+              <a:ext cx="0" cy="1596533"/>
+            </a:xfrm>
+            <a:prstGeom prst="line">
+              <a:avLst/>
+            </a:prstGeom>
+          </p:spPr>
+          <p:style>
+            <a:lnRef idx="1">
+              <a:schemeClr val="accent1"/>
+            </a:lnRef>
+            <a:fillRef idx="0">
+              <a:schemeClr val="accent1"/>
+            </a:fillRef>
+            <a:effectRef idx="0">
+              <a:schemeClr val="accent1"/>
+            </a:effectRef>
+            <a:fontRef idx="minor">
+              <a:schemeClr val="tx1"/>
+            </a:fontRef>
+          </p:style>
+        </p:cxnSp>
+        <p:cxnSp>
+          <p:nvCxnSpPr>
+            <p:cNvPr id="28" name="Conector recto 27">
+              <a:extLst>
+                <a:ext uri="{FF2B5EF4-FFF2-40B4-BE49-F238E27FC236}">
+                  <a16:creationId xmlns:a16="http://schemas.microsoft.com/office/drawing/2014/main" id="{8A240E3C-2B3C-4555-AD25-189139FCE776}"/>
+                </a:ext>
+              </a:extLst>
+            </p:cNvPr>
+            <p:cNvCxnSpPr>
+              <a:cxnSpLocks/>
+            </p:cNvCxnSpPr>
+            <p:nvPr/>
+          </p:nvCxnSpPr>
+          <p:spPr>
+            <a:xfrm>
+              <a:off x="6096000" y="3817219"/>
+              <a:ext cx="391886" cy="0"/>
+            </a:xfrm>
+            <a:prstGeom prst="line">
+              <a:avLst/>
+            </a:prstGeom>
+          </p:spPr>
+          <p:style>
+            <a:lnRef idx="1">
+              <a:schemeClr val="accent1"/>
+            </a:lnRef>
+            <a:fillRef idx="0">
+              <a:schemeClr val="accent1"/>
+            </a:fillRef>
+            <a:effectRef idx="0">
+              <a:schemeClr val="accent1"/>
+            </a:effectRef>
+            <a:fontRef idx="minor">
+              <a:schemeClr val="tx1"/>
+            </a:fontRef>
+          </p:style>
+        </p:cxnSp>
+      </p:grpSp>
+      <p:cxnSp>
+        <p:nvCxnSpPr>
+          <p:cNvPr id="31" name="Conector recto 30">
+            <a:extLst>
+              <a:ext uri="{FF2B5EF4-FFF2-40B4-BE49-F238E27FC236}">
+                <a16:creationId xmlns:a16="http://schemas.microsoft.com/office/drawing/2014/main" id="{423D1203-C9D7-48F6-B8D8-B28F5476E92E}"/>
+              </a:ext>
+            </a:extLst>
+          </p:cNvPr>
+          <p:cNvCxnSpPr>
+            <a:cxnSpLocks/>
+            <a:stCxn id="8" idx="2"/>
+            <a:endCxn id="21" idx="0"/>
+          </p:cNvCxnSpPr>
+          <p:nvPr/>
+        </p:nvCxnSpPr>
+        <p:spPr>
+          <a:xfrm>
+            <a:off x="12103323" y="4132077"/>
+            <a:ext cx="0" cy="1005732"/>
+          </a:xfrm>
+          <a:prstGeom prst="line">
+            <a:avLst/>
+          </a:prstGeom>
+        </p:spPr>
+        <p:style>
+          <a:lnRef idx="1">
+            <a:schemeClr val="accent1"/>
+          </a:lnRef>
+          <a:fillRef idx="0">
+            <a:schemeClr val="accent1"/>
+          </a:fillRef>
+          <a:effectRef idx="0">
+            <a:schemeClr val="accent1"/>
+          </a:effectRef>
+          <a:fontRef idx="minor">
+            <a:schemeClr val="tx1"/>
+          </a:fontRef>
+        </p:style>
+      </p:cxnSp>
+      <p:cxnSp>
+        <p:nvCxnSpPr>
+          <p:cNvPr id="34" name="Conector recto 33">
+            <a:extLst>
+              <a:ext uri="{FF2B5EF4-FFF2-40B4-BE49-F238E27FC236}">
+                <a16:creationId xmlns:a16="http://schemas.microsoft.com/office/drawing/2014/main" id="{401CF9E0-ED63-4CF9-8305-11A6A6F41C81}"/>
+              </a:ext>
+            </a:extLst>
+          </p:cNvPr>
+          <p:cNvCxnSpPr>
+            <a:cxnSpLocks/>
+            <a:stCxn id="10" idx="2"/>
+            <a:endCxn id="19" idx="0"/>
+          </p:cNvCxnSpPr>
+          <p:nvPr/>
+        </p:nvCxnSpPr>
+        <p:spPr>
+          <a:xfrm>
+            <a:off x="3984140" y="5514283"/>
+            <a:ext cx="0" cy="601027"/>
+          </a:xfrm>
+          <a:prstGeom prst="line">
+            <a:avLst/>
+          </a:prstGeom>
+        </p:spPr>
+        <p:style>
+          <a:lnRef idx="1">
+            <a:schemeClr val="accent1"/>
+          </a:lnRef>
+          <a:fillRef idx="0">
+            <a:schemeClr val="accent1"/>
+          </a:fillRef>
+          <a:effectRef idx="0">
+            <a:schemeClr val="accent1"/>
+          </a:effectRef>
+          <a:fontRef idx="minor">
+            <a:schemeClr val="tx1"/>
+          </a:fontRef>
+        </p:style>
+      </p:cxnSp>
+      <p:cxnSp>
+        <p:nvCxnSpPr>
+          <p:cNvPr id="38" name="Conector: angular 37">
+            <a:extLst>
+              <a:ext uri="{FF2B5EF4-FFF2-40B4-BE49-F238E27FC236}">
+                <a16:creationId xmlns:a16="http://schemas.microsoft.com/office/drawing/2014/main" id="{9EB12A6D-9F8C-4460-9860-3C431E33E466}"/>
+              </a:ext>
+            </a:extLst>
+          </p:cNvPr>
+          <p:cNvCxnSpPr/>
+          <p:nvPr/>
+        </p:nvCxnSpPr>
+        <p:spPr>
+          <a:xfrm>
+            <a:off x="5505551" y="4876800"/>
+            <a:ext cx="982335" cy="377371"/>
+          </a:xfrm>
+          <a:prstGeom prst="bentConnector3">
+            <a:avLst/>
+          </a:prstGeom>
+        </p:spPr>
+        <p:style>
+          <a:lnRef idx="1">
+            <a:schemeClr val="accent1"/>
+          </a:lnRef>
+          <a:fillRef idx="0">
+            <a:schemeClr val="accent1"/>
+          </a:fillRef>
+          <a:effectRef idx="0">
+            <a:schemeClr val="accent1"/>
+          </a:effectRef>
+          <a:fontRef idx="minor">
+            <a:schemeClr val="tx1"/>
+          </a:fontRef>
+        </p:style>
+      </p:cxnSp>
+      <p:cxnSp>
+        <p:nvCxnSpPr>
+          <p:cNvPr id="40" name="Conector: angular 39">
+            <a:extLst>
+              <a:ext uri="{FF2B5EF4-FFF2-40B4-BE49-F238E27FC236}">
+                <a16:creationId xmlns:a16="http://schemas.microsoft.com/office/drawing/2014/main" id="{B54A76AE-B9C1-486F-BB11-728CB15F8231}"/>
+              </a:ext>
+            </a:extLst>
+          </p:cNvPr>
+          <p:cNvCxnSpPr>
+            <a:cxnSpLocks/>
+          </p:cNvCxnSpPr>
+          <p:nvPr/>
+        </p:nvCxnSpPr>
+        <p:spPr>
+          <a:xfrm flipV="1">
+            <a:off x="9565142" y="3439886"/>
+            <a:ext cx="1016771" cy="159657"/>
+          </a:xfrm>
+          <a:prstGeom prst="bentConnector3">
+            <a:avLst/>
+          </a:prstGeom>
+        </p:spPr>
+        <p:style>
+          <a:lnRef idx="1">
+            <a:schemeClr val="accent1"/>
+          </a:lnRef>
+          <a:fillRef idx="0">
+            <a:schemeClr val="accent1"/>
+          </a:fillRef>
+          <a:effectRef idx="0">
+            <a:schemeClr val="accent1"/>
+          </a:effectRef>
+          <a:fontRef idx="minor">
+            <a:schemeClr val="tx1"/>
+          </a:fontRef>
+        </p:style>
+      </p:cxnSp>
     </p:spTree>
     <p:extLst>
       <p:ext uri="{BB962C8B-B14F-4D97-AF65-F5344CB8AC3E}">
@@ -5255,7 +5772,7 @@
 </file>
 
 <file path=ppt/theme/theme1.xml><?xml version="1.0" encoding="utf-8"?>
-<a:theme xmlns:a="http://schemas.openxmlformats.org/drawingml/2006/main" name="Tema de Office">
+<a:theme xmlns:a="http://schemas.openxmlformats.org/drawingml/2006/main" name="Office Theme">
   <a:themeElements>
     <a:clrScheme name="Tema de Office">
       <a:dk1>

</xml_diff>

<commit_message>
to update readme and images
</commit_message>
<xml_diff>
--- a/16_Project_5_Capstone_Project/Images/capstone_project.pptx
+++ b/16_Project_5_Capstone_Project/Images/capstone_project.pptx
@@ -244,7 +244,7 @@
           <a:p>
             <a:fld id="{6A87B696-1102-4874-86CF-7F32C533EC34}" type="datetimeFigureOut">
               <a:rPr lang="es-MX" smtClean="0"/>
-              <a:t>08/07/2021</a:t>
+              <a:t>17/07/2021</a:t>
             </a:fld>
             <a:endParaRPr lang="es-MX"/>
           </a:p>
@@ -414,7 +414,7 @@
           <a:p>
             <a:fld id="{6A87B696-1102-4874-86CF-7F32C533EC34}" type="datetimeFigureOut">
               <a:rPr lang="es-MX" smtClean="0"/>
-              <a:t>08/07/2021</a:t>
+              <a:t>17/07/2021</a:t>
             </a:fld>
             <a:endParaRPr lang="es-MX"/>
           </a:p>
@@ -594,7 +594,7 @@
           <a:p>
             <a:fld id="{6A87B696-1102-4874-86CF-7F32C533EC34}" type="datetimeFigureOut">
               <a:rPr lang="es-MX" smtClean="0"/>
-              <a:t>08/07/2021</a:t>
+              <a:t>17/07/2021</a:t>
             </a:fld>
             <a:endParaRPr lang="es-MX"/>
           </a:p>
@@ -764,7 +764,7 @@
           <a:p>
             <a:fld id="{6A87B696-1102-4874-86CF-7F32C533EC34}" type="datetimeFigureOut">
               <a:rPr lang="es-MX" smtClean="0"/>
-              <a:t>08/07/2021</a:t>
+              <a:t>17/07/2021</a:t>
             </a:fld>
             <a:endParaRPr lang="es-MX"/>
           </a:p>
@@ -1008,7 +1008,7 @@
           <a:p>
             <a:fld id="{6A87B696-1102-4874-86CF-7F32C533EC34}" type="datetimeFigureOut">
               <a:rPr lang="es-MX" smtClean="0"/>
-              <a:t>08/07/2021</a:t>
+              <a:t>17/07/2021</a:t>
             </a:fld>
             <a:endParaRPr lang="es-MX"/>
           </a:p>
@@ -1240,7 +1240,7 @@
           <a:p>
             <a:fld id="{6A87B696-1102-4874-86CF-7F32C533EC34}" type="datetimeFigureOut">
               <a:rPr lang="es-MX" smtClean="0"/>
-              <a:t>08/07/2021</a:t>
+              <a:t>17/07/2021</a:t>
             </a:fld>
             <a:endParaRPr lang="es-MX"/>
           </a:p>
@@ -1607,7 +1607,7 @@
           <a:p>
             <a:fld id="{6A87B696-1102-4874-86CF-7F32C533EC34}" type="datetimeFigureOut">
               <a:rPr lang="es-MX" smtClean="0"/>
-              <a:t>08/07/2021</a:t>
+              <a:t>17/07/2021</a:t>
             </a:fld>
             <a:endParaRPr lang="es-MX"/>
           </a:p>
@@ -1725,7 +1725,7 @@
           <a:p>
             <a:fld id="{6A87B696-1102-4874-86CF-7F32C533EC34}" type="datetimeFigureOut">
               <a:rPr lang="es-MX" smtClean="0"/>
-              <a:t>08/07/2021</a:t>
+              <a:t>17/07/2021</a:t>
             </a:fld>
             <a:endParaRPr lang="es-MX"/>
           </a:p>
@@ -1820,7 +1820,7 @@
           <a:p>
             <a:fld id="{6A87B696-1102-4874-86CF-7F32C533EC34}" type="datetimeFigureOut">
               <a:rPr lang="es-MX" smtClean="0"/>
-              <a:t>08/07/2021</a:t>
+              <a:t>17/07/2021</a:t>
             </a:fld>
             <a:endParaRPr lang="es-MX"/>
           </a:p>
@@ -2097,7 +2097,7 @@
           <a:p>
             <a:fld id="{6A87B696-1102-4874-86CF-7F32C533EC34}" type="datetimeFigureOut">
               <a:rPr lang="es-MX" smtClean="0"/>
-              <a:t>08/07/2021</a:t>
+              <a:t>17/07/2021</a:t>
             </a:fld>
             <a:endParaRPr lang="es-MX"/>
           </a:p>
@@ -2354,7 +2354,7 @@
           <a:p>
             <a:fld id="{6A87B696-1102-4874-86CF-7F32C533EC34}" type="datetimeFigureOut">
               <a:rPr lang="es-MX" smtClean="0"/>
-              <a:t>08/07/2021</a:t>
+              <a:t>17/07/2021</a:t>
             </a:fld>
             <a:endParaRPr lang="es-MX"/>
           </a:p>
@@ -2567,7 +2567,7 @@
           <a:p>
             <a:fld id="{6A87B696-1102-4874-86CF-7F32C533EC34}" type="datetimeFigureOut">
               <a:rPr lang="es-MX" smtClean="0"/>
-              <a:t>08/07/2021</a:t>
+              <a:t>17/07/2021</a:t>
             </a:fld>
             <a:endParaRPr lang="es-MX"/>
           </a:p>
@@ -3471,36 +3471,6 @@
       </p:sp>
       <p:pic>
         <p:nvPicPr>
-          <p:cNvPr id="5" name="Imagen 4">
-            <a:extLst>
-              <a:ext uri="{FF2B5EF4-FFF2-40B4-BE49-F238E27FC236}">
-                <a16:creationId xmlns:a16="http://schemas.microsoft.com/office/drawing/2014/main" id="{BB58CD9D-369D-4258-B8C9-B64C750765B6}"/>
-              </a:ext>
-            </a:extLst>
-          </p:cNvPr>
-          <p:cNvPicPr>
-            <a:picLocks noChangeAspect="1"/>
-          </p:cNvPicPr>
-          <p:nvPr/>
-        </p:nvPicPr>
-        <p:blipFill>
-          <a:blip r:embed="rId4"/>
-          <a:stretch>
-            <a:fillRect/>
-          </a:stretch>
-        </p:blipFill>
-        <p:spPr>
-          <a:xfrm>
-            <a:off x="497849" y="228750"/>
-            <a:ext cx="8871384" cy="6426514"/>
-          </a:xfrm>
-          <a:prstGeom prst="rect">
-            <a:avLst/>
-          </a:prstGeom>
-        </p:spPr>
-      </p:pic>
-      <p:pic>
-        <p:nvPicPr>
           <p:cNvPr id="10" name="Imagen 9">
             <a:extLst>
               <a:ext uri="{FF2B5EF4-FFF2-40B4-BE49-F238E27FC236}">
@@ -3514,7 +3484,7 @@
           <p:nvPr/>
         </p:nvPicPr>
         <p:blipFill>
-          <a:blip r:embed="rId5"/>
+          <a:blip r:embed="rId4"/>
           <a:stretch>
             <a:fillRect/>
           </a:stretch>
@@ -3544,7 +3514,7 @@
           <p:nvPr/>
         </p:nvPicPr>
         <p:blipFill>
-          <a:blip r:embed="rId6"/>
+          <a:blip r:embed="rId5"/>
           <a:stretch>
             <a:fillRect/>
           </a:stretch>
@@ -3553,6 +3523,36 @@
           <a:xfrm>
             <a:off x="9066430" y="3151070"/>
             <a:ext cx="3811330" cy="6493377"/>
+          </a:xfrm>
+          <a:prstGeom prst="rect">
+            <a:avLst/>
+          </a:prstGeom>
+        </p:spPr>
+      </p:pic>
+      <p:pic>
+        <p:nvPicPr>
+          <p:cNvPr id="7" name="Imagen 6">
+            <a:extLst>
+              <a:ext uri="{FF2B5EF4-FFF2-40B4-BE49-F238E27FC236}">
+                <a16:creationId xmlns:a16="http://schemas.microsoft.com/office/drawing/2014/main" id="{46D2AAED-9E34-427A-B239-3507EF4645F5}"/>
+              </a:ext>
+            </a:extLst>
+          </p:cNvPr>
+          <p:cNvPicPr>
+            <a:picLocks noChangeAspect="1"/>
+          </p:cNvPicPr>
+          <p:nvPr/>
+        </p:nvPicPr>
+        <p:blipFill>
+          <a:blip r:embed="rId6"/>
+          <a:stretch>
+            <a:fillRect/>
+          </a:stretch>
+        </p:blipFill>
+        <p:spPr>
+          <a:xfrm>
+            <a:off x="720485" y="355986"/>
+            <a:ext cx="6543675" cy="6391275"/>
           </a:xfrm>
           <a:prstGeom prst="rect">
             <a:avLst/>

</xml_diff>